<commit_message>
Presentation changes & last run of R markdown
</commit_message>
<xml_diff>
--- a/resources/land_classification_diagram.pptx
+++ b/resources/land_classification_diagram.pptx
@@ -243,7 +243,7 @@
           <a:p>
             <a:fld id="{F584BFBA-6407-43D9-9246-BFF906A42630}" type="datetimeFigureOut">
               <a:rPr lang="en-US" smtClean="0"/>
-              <a:t>2/12/2025</a:t>
+              <a:t>2/19/2025</a:t>
             </a:fld>
             <a:endParaRPr lang="en-US"/>
           </a:p>
@@ -413,7 +413,7 @@
           <a:p>
             <a:fld id="{F584BFBA-6407-43D9-9246-BFF906A42630}" type="datetimeFigureOut">
               <a:rPr lang="en-US" smtClean="0"/>
-              <a:t>2/12/2025</a:t>
+              <a:t>2/19/2025</a:t>
             </a:fld>
             <a:endParaRPr lang="en-US"/>
           </a:p>
@@ -593,7 +593,7 @@
           <a:p>
             <a:fld id="{F584BFBA-6407-43D9-9246-BFF906A42630}" type="datetimeFigureOut">
               <a:rPr lang="en-US" smtClean="0"/>
-              <a:t>2/12/2025</a:t>
+              <a:t>2/19/2025</a:t>
             </a:fld>
             <a:endParaRPr lang="en-US"/>
           </a:p>
@@ -763,7 +763,7 @@
           <a:p>
             <a:fld id="{F584BFBA-6407-43D9-9246-BFF906A42630}" type="datetimeFigureOut">
               <a:rPr lang="en-US" smtClean="0"/>
-              <a:t>2/12/2025</a:t>
+              <a:t>2/19/2025</a:t>
             </a:fld>
             <a:endParaRPr lang="en-US"/>
           </a:p>
@@ -1009,7 +1009,7 @@
           <a:p>
             <a:fld id="{F584BFBA-6407-43D9-9246-BFF906A42630}" type="datetimeFigureOut">
               <a:rPr lang="en-US" smtClean="0"/>
-              <a:t>2/12/2025</a:t>
+              <a:t>2/19/2025</a:t>
             </a:fld>
             <a:endParaRPr lang="en-US"/>
           </a:p>
@@ -1241,7 +1241,7 @@
           <a:p>
             <a:fld id="{F584BFBA-6407-43D9-9246-BFF906A42630}" type="datetimeFigureOut">
               <a:rPr lang="en-US" smtClean="0"/>
-              <a:t>2/12/2025</a:t>
+              <a:t>2/19/2025</a:t>
             </a:fld>
             <a:endParaRPr lang="en-US"/>
           </a:p>
@@ -1608,7 +1608,7 @@
           <a:p>
             <a:fld id="{F584BFBA-6407-43D9-9246-BFF906A42630}" type="datetimeFigureOut">
               <a:rPr lang="en-US" smtClean="0"/>
-              <a:t>2/12/2025</a:t>
+              <a:t>2/19/2025</a:t>
             </a:fld>
             <a:endParaRPr lang="en-US"/>
           </a:p>
@@ -1726,7 +1726,7 @@
           <a:p>
             <a:fld id="{F584BFBA-6407-43D9-9246-BFF906A42630}" type="datetimeFigureOut">
               <a:rPr lang="en-US" smtClean="0"/>
-              <a:t>2/12/2025</a:t>
+              <a:t>2/19/2025</a:t>
             </a:fld>
             <a:endParaRPr lang="en-US"/>
           </a:p>
@@ -1821,7 +1821,7 @@
           <a:p>
             <a:fld id="{F584BFBA-6407-43D9-9246-BFF906A42630}" type="datetimeFigureOut">
               <a:rPr lang="en-US" smtClean="0"/>
-              <a:t>2/12/2025</a:t>
+              <a:t>2/19/2025</a:t>
             </a:fld>
             <a:endParaRPr lang="en-US"/>
           </a:p>
@@ -2098,7 +2098,7 @@
           <a:p>
             <a:fld id="{F584BFBA-6407-43D9-9246-BFF906A42630}" type="datetimeFigureOut">
               <a:rPr lang="en-US" smtClean="0"/>
-              <a:t>2/12/2025</a:t>
+              <a:t>2/19/2025</a:t>
             </a:fld>
             <a:endParaRPr lang="en-US"/>
           </a:p>
@@ -2355,7 +2355,7 @@
           <a:p>
             <a:fld id="{F584BFBA-6407-43D9-9246-BFF906A42630}" type="datetimeFigureOut">
               <a:rPr lang="en-US" smtClean="0"/>
-              <a:t>2/12/2025</a:t>
+              <a:t>2/19/2025</a:t>
             </a:fld>
             <a:endParaRPr lang="en-US"/>
           </a:p>
@@ -2568,7 +2568,7 @@
           <a:p>
             <a:fld id="{F584BFBA-6407-43D9-9246-BFF906A42630}" type="datetimeFigureOut">
               <a:rPr lang="en-US" smtClean="0"/>
-              <a:t>2/12/2025</a:t>
+              <a:t>2/19/2025</a:t>
             </a:fld>
             <a:endParaRPr lang="en-US"/>
           </a:p>
@@ -2988,9 +2988,9 @@
         <p:grpSpPr>
           <a:xfrm>
             <a:off x="457322" y="204291"/>
-            <a:ext cx="5742312" cy="8182968"/>
+            <a:ext cx="5742312" cy="8148877"/>
             <a:chOff x="3315590" y="378639"/>
-            <a:chExt cx="5873745" cy="3830420"/>
+            <a:chExt cx="5873745" cy="3814464"/>
           </a:xfrm>
         </p:grpSpPr>
         <p:sp>
@@ -3065,7 +3065,7 @@
                   <a:latin typeface="Times New Roman" panose="02020603050405020304" pitchFamily="18" charset="0"/>
                   <a:cs typeface="Times New Roman" panose="02020603050405020304" pitchFamily="18" charset="0"/>
                 </a:rPr>
-                <a:t>The total area within the province</a:t>
+                <a:t>The total terrestrial area within the province</a:t>
               </a:r>
               <a:endParaRPr lang="en-US" sz="1000" i="1" dirty="0">
                 <a:solidFill>
@@ -3091,7 +3091,7 @@
           </p:nvSpPr>
           <p:spPr>
             <a:xfrm>
-              <a:off x="3324512" y="2748102"/>
+              <a:off x="3335077" y="2626282"/>
               <a:ext cx="2768018" cy="491925"/>
             </a:xfrm>
             <a:prstGeom prst="roundRect">
@@ -3136,7 +3136,7 @@
                   <a:latin typeface="Times New Roman" panose="02020603050405020304" pitchFamily="18" charset="0"/>
                   <a:cs typeface="Times New Roman" panose="02020603050405020304" pitchFamily="18" charset="0"/>
                 </a:rPr>
-                <a:t>Analysis Forest Land Base</a:t>
+                <a:t>Provincial Proxy Analysis Forest Land Base</a:t>
               </a:r>
               <a:r>
                 <a:rPr lang="en-CA" sz="1000" dirty="0">
@@ -3146,7 +3146,27 @@
                   <a:latin typeface="Times New Roman" panose="02020603050405020304" pitchFamily="18" charset="0"/>
                   <a:cs typeface="Times New Roman" panose="02020603050405020304" pitchFamily="18" charset="0"/>
                 </a:rPr>
-                <a:t> (AFLB)</a:t>
+                <a:t> (</a:t>
+              </a:r>
+              <a:r>
+                <a:rPr lang="en-CA" sz="1000" dirty="0" err="1">
+                  <a:solidFill>
+                    <a:sysClr val="windowText" lastClr="000000"/>
+                  </a:solidFill>
+                  <a:latin typeface="Times New Roman" panose="02020603050405020304" pitchFamily="18" charset="0"/>
+                  <a:cs typeface="Times New Roman" panose="02020603050405020304" pitchFamily="18" charset="0"/>
+                </a:rPr>
+                <a:t>pAFLB</a:t>
+              </a:r>
+              <a:r>
+                <a:rPr lang="en-CA" sz="1000" dirty="0">
+                  <a:solidFill>
+                    <a:sysClr val="windowText" lastClr="000000"/>
+                  </a:solidFill>
+                  <a:latin typeface="Times New Roman" panose="02020603050405020304" pitchFamily="18" charset="0"/>
+                  <a:cs typeface="Times New Roman" panose="02020603050405020304" pitchFamily="18" charset="0"/>
+                </a:rPr>
+                <a:t>)</a:t>
               </a:r>
             </a:p>
             <a:p>
@@ -3178,8 +3198,8 @@
           </p:nvSpPr>
           <p:spPr>
             <a:xfrm>
-              <a:off x="3386745" y="3426755"/>
-              <a:ext cx="2652986" cy="782304"/>
+              <a:off x="3386745" y="3353491"/>
+              <a:ext cx="2652986" cy="839612"/>
             </a:xfrm>
             <a:prstGeom prst="roundRect">
               <a:avLst/>
@@ -3223,7 +3243,7 @@
                   <a:latin typeface="Times New Roman" panose="02020603050405020304" pitchFamily="18" charset="0"/>
                   <a:cs typeface="Times New Roman" panose="02020603050405020304" pitchFamily="18" charset="0"/>
                 </a:rPr>
-                <a:t>Timber Harvesting Land Base</a:t>
+                <a:t>Provincial Timber Harvesting Land Base</a:t>
               </a:r>
               <a:r>
                 <a:rPr lang="en-CA" sz="1000" dirty="0">
@@ -3233,7 +3253,27 @@
                   <a:latin typeface="Times New Roman" panose="02020603050405020304" pitchFamily="18" charset="0"/>
                   <a:cs typeface="Times New Roman" panose="02020603050405020304" pitchFamily="18" charset="0"/>
                 </a:rPr>
-                <a:t> (THLB)</a:t>
+                <a:t> (</a:t>
+              </a:r>
+              <a:r>
+                <a:rPr lang="en-CA" sz="1000" dirty="0" err="1">
+                  <a:solidFill>
+                    <a:sysClr val="windowText" lastClr="000000"/>
+                  </a:solidFill>
+                  <a:latin typeface="Times New Roman" panose="02020603050405020304" pitchFamily="18" charset="0"/>
+                  <a:cs typeface="Times New Roman" panose="02020603050405020304" pitchFamily="18" charset="0"/>
+                </a:rPr>
+                <a:t>pTHLB</a:t>
+              </a:r>
+              <a:r>
+                <a:rPr lang="en-CA" sz="1000" dirty="0">
+                  <a:solidFill>
+                    <a:sysClr val="windowText" lastClr="000000"/>
+                  </a:solidFill>
+                  <a:latin typeface="Times New Roman" panose="02020603050405020304" pitchFamily="18" charset="0"/>
+                  <a:cs typeface="Times New Roman" panose="02020603050405020304" pitchFamily="18" charset="0"/>
+                </a:rPr>
+                <a:t>)</a:t>
               </a:r>
             </a:p>
             <a:p>
@@ -3246,7 +3286,7 @@
                   <a:latin typeface="Times New Roman" panose="02020603050405020304" pitchFamily="18" charset="0"/>
                   <a:cs typeface="Times New Roman" panose="02020603050405020304" pitchFamily="18" charset="0"/>
                 </a:rPr>
-                <a:t>The portion of the AFLB where timber harvesting is considered both acceptable and economically feasible, given the objectives for all relevant forest values, existing timber quality, market values and applicable technology. It includes areas where timber harvesting is limited due to management objectives (e.g., conditional harvest zones).</a:t>
+                <a:t>The portion of the AFLB where timber harvesting is considered both available and economically feasible, given the objectives for all relevant forest values, existing timber quality, market values and applicable technology. It includes areas where timber harvesting is limited due to management objectives (e.g., conditional harvest zones).</a:t>
               </a:r>
               <a:endParaRPr lang="en-US" sz="1000" i="1" dirty="0">
                 <a:solidFill>
@@ -3539,18 +3579,14 @@
                   <a:latin typeface="Times New Roman" panose="02020603050405020304" pitchFamily="18" charset="0"/>
                   <a:cs typeface="Times New Roman" panose="02020603050405020304" pitchFamily="18" charset="0"/>
                 </a:rPr>
-                <a:t>Stand-level retention areas (e.g., wildlife tree retention or riparian reserve zones </a:t>
+                <a:t>Non-commercial species</a:t>
               </a:r>
-              <a:r>
-                <a:rPr lang="en-CA" sz="1000" dirty="0" err="1">
-                  <a:solidFill>
-                    <a:sysClr val="windowText" lastClr="000000"/>
-                  </a:solidFill>
-                  <a:latin typeface="Times New Roman" panose="02020603050405020304" pitchFamily="18" charset="0"/>
-                  <a:cs typeface="Times New Roman" panose="02020603050405020304" pitchFamily="18" charset="0"/>
-                </a:rPr>
-                <a:t>etc</a:t>
-              </a:r>
+            </a:p>
+            <a:p>
+              <a:pPr marL="140771" indent="-140771">
+                <a:buFont typeface="Arial" panose="020B0604020202020204" pitchFamily="34" charset="0"/>
+                <a:buChar char="•"/>
+              </a:pPr>
               <a:r>
                 <a:rPr lang="en-CA" sz="1000" dirty="0">
                   <a:solidFill>
@@ -3559,7 +3595,7 @@
                   <a:latin typeface="Times New Roman" panose="02020603050405020304" pitchFamily="18" charset="0"/>
                   <a:cs typeface="Times New Roman" panose="02020603050405020304" pitchFamily="18" charset="0"/>
                 </a:rPr>
-                <a:t>)</a:t>
+                <a:t>Stand-level retention areas (e.g., wildlife tree retention or riparian reserve zones, etc.)</a:t>
               </a:r>
             </a:p>
             <a:p>
@@ -3788,7 +3824,27 @@
                 <a:latin typeface="Times New Roman" panose="02020603050405020304" pitchFamily="18" charset="0"/>
                 <a:cs typeface="Times New Roman" panose="02020603050405020304" pitchFamily="18" charset="0"/>
               </a:rPr>
-              <a:t>The forested area within the province as defined by the Old Growth Technical Advisory Panel (TAP). </a:t>
+              <a:t>The forested area within the province as defined by </a:t>
+            </a:r>
+            <a:r>
+              <a:rPr lang="en-US" sz="1000" i="1">
+                <a:solidFill>
+                  <a:sysClr val="windowText" lastClr="000000"/>
+                </a:solidFill>
+                <a:latin typeface="Times New Roman" panose="02020603050405020304" pitchFamily="18" charset="0"/>
+                <a:cs typeface="Times New Roman" panose="02020603050405020304" pitchFamily="18" charset="0"/>
+              </a:rPr>
+              <a:t>FAIB for </a:t>
+            </a:r>
+            <a:r>
+              <a:rPr lang="en-US" sz="1000" i="1" dirty="0">
+                <a:solidFill>
+                  <a:sysClr val="windowText" lastClr="000000"/>
+                </a:solidFill>
+                <a:latin typeface="Times New Roman" panose="02020603050405020304" pitchFamily="18" charset="0"/>
+                <a:cs typeface="Times New Roman" panose="02020603050405020304" pitchFamily="18" charset="0"/>
+              </a:rPr>
+              <a:t>the Old Growth Technical Advisory Panel (TAP). </a:t>
             </a:r>
           </a:p>
         </p:txBody>
@@ -3807,7 +3863,7 @@
         </p:nvSpPr>
         <p:spPr>
           <a:xfrm>
-            <a:off x="466045" y="3577100"/>
+            <a:off x="466045" y="3445292"/>
             <a:ext cx="2706082" cy="1050905"/>
           </a:xfrm>
           <a:prstGeom prst="roundRect">
@@ -3892,14 +3948,13 @@
           <p:cNvCxnSpPr>
             <a:cxnSpLocks/>
             <a:stCxn id="35" idx="2"/>
-            <a:endCxn id="45" idx="0"/>
           </p:cNvCxnSpPr>
           <p:nvPr/>
         </p:nvCxnSpPr>
         <p:spPr>
           <a:xfrm>
             <a:off x="1819086" y="2936772"/>
-            <a:ext cx="0" cy="640328"/>
+            <a:ext cx="0" cy="504985"/>
           </a:xfrm>
           <a:prstGeom prst="line">
             <a:avLst/>
@@ -4096,7 +4151,7 @@
         </p:nvSpPr>
         <p:spPr>
           <a:xfrm>
-            <a:off x="1912564" y="4712128"/>
+            <a:off x="1912564" y="4555606"/>
             <a:ext cx="754519" cy="218842"/>
           </a:xfrm>
           <a:prstGeom prst="rect">
@@ -4191,7 +4246,7 @@
         </p:nvSpPr>
         <p:spPr>
           <a:xfrm>
-            <a:off x="1912564" y="6384496"/>
+            <a:off x="1912564" y="6087931"/>
             <a:ext cx="754519" cy="218842"/>
           </a:xfrm>
           <a:prstGeom prst="rect">
@@ -4242,7 +4297,7 @@
         </p:nvCxnSpPr>
         <p:spPr>
           <a:xfrm flipH="1" flipV="1">
-            <a:off x="1829413" y="6607887"/>
+            <a:off x="1829413" y="6336033"/>
             <a:ext cx="1589548" cy="1625"/>
           </a:xfrm>
           <a:prstGeom prst="line">
@@ -4288,7 +4343,7 @@
         </p:nvCxnSpPr>
         <p:spPr>
           <a:xfrm flipH="1" flipV="1">
-            <a:off x="1825193" y="4923892"/>
+            <a:off x="1825193" y="4783846"/>
             <a:ext cx="1589548" cy="1625"/>
           </a:xfrm>
           <a:prstGeom prst="line">
@@ -4375,13 +4430,14 @@
           </p:cNvPr>
           <p:cNvCxnSpPr>
             <a:cxnSpLocks/>
+            <a:stCxn id="45" idx="2"/>
           </p:cNvCxnSpPr>
           <p:nvPr/>
         </p:nvCxnSpPr>
         <p:spPr>
-          <a:xfrm flipH="1">
-            <a:off x="1819085" y="4617003"/>
-            <a:ext cx="2" cy="650658"/>
+          <a:xfrm>
+            <a:off x="1819086" y="4496197"/>
+            <a:ext cx="0" cy="508520"/>
           </a:xfrm>
           <a:prstGeom prst="line">
             <a:avLst/>
@@ -4421,14 +4477,14 @@
           </p:cNvPr>
           <p:cNvCxnSpPr>
             <a:cxnSpLocks/>
-            <a:endCxn id="8" idx="0"/>
+            <a:stCxn id="6" idx="2"/>
           </p:cNvCxnSpPr>
           <p:nvPr/>
         </p:nvCxnSpPr>
         <p:spPr>
           <a:xfrm>
-            <a:off x="1819089" y="6322389"/>
-            <a:ext cx="4609" cy="393627"/>
+            <a:off x="1829413" y="6056860"/>
+            <a:ext cx="0" cy="507535"/>
           </a:xfrm>
           <a:prstGeom prst="line">
             <a:avLst/>

</xml_diff>

<commit_message>
cleaning up the last edits
</commit_message>
<xml_diff>
--- a/resources/land_classification_diagram.pptx
+++ b/resources/land_classification_diagram.pptx
@@ -243,7 +243,7 @@
           <a:p>
             <a:fld id="{F584BFBA-6407-43D9-9246-BFF906A42630}" type="datetimeFigureOut">
               <a:rPr lang="en-US" smtClean="0"/>
-              <a:t>2/19/2025</a:t>
+              <a:t>2/24/2025</a:t>
             </a:fld>
             <a:endParaRPr lang="en-US"/>
           </a:p>
@@ -413,7 +413,7 @@
           <a:p>
             <a:fld id="{F584BFBA-6407-43D9-9246-BFF906A42630}" type="datetimeFigureOut">
               <a:rPr lang="en-US" smtClean="0"/>
-              <a:t>2/19/2025</a:t>
+              <a:t>2/24/2025</a:t>
             </a:fld>
             <a:endParaRPr lang="en-US"/>
           </a:p>
@@ -593,7 +593,7 @@
           <a:p>
             <a:fld id="{F584BFBA-6407-43D9-9246-BFF906A42630}" type="datetimeFigureOut">
               <a:rPr lang="en-US" smtClean="0"/>
-              <a:t>2/19/2025</a:t>
+              <a:t>2/24/2025</a:t>
             </a:fld>
             <a:endParaRPr lang="en-US"/>
           </a:p>
@@ -763,7 +763,7 @@
           <a:p>
             <a:fld id="{F584BFBA-6407-43D9-9246-BFF906A42630}" type="datetimeFigureOut">
               <a:rPr lang="en-US" smtClean="0"/>
-              <a:t>2/19/2025</a:t>
+              <a:t>2/24/2025</a:t>
             </a:fld>
             <a:endParaRPr lang="en-US"/>
           </a:p>
@@ -1009,7 +1009,7 @@
           <a:p>
             <a:fld id="{F584BFBA-6407-43D9-9246-BFF906A42630}" type="datetimeFigureOut">
               <a:rPr lang="en-US" smtClean="0"/>
-              <a:t>2/19/2025</a:t>
+              <a:t>2/24/2025</a:t>
             </a:fld>
             <a:endParaRPr lang="en-US"/>
           </a:p>
@@ -1241,7 +1241,7 @@
           <a:p>
             <a:fld id="{F584BFBA-6407-43D9-9246-BFF906A42630}" type="datetimeFigureOut">
               <a:rPr lang="en-US" smtClean="0"/>
-              <a:t>2/19/2025</a:t>
+              <a:t>2/24/2025</a:t>
             </a:fld>
             <a:endParaRPr lang="en-US"/>
           </a:p>
@@ -1608,7 +1608,7 @@
           <a:p>
             <a:fld id="{F584BFBA-6407-43D9-9246-BFF906A42630}" type="datetimeFigureOut">
               <a:rPr lang="en-US" smtClean="0"/>
-              <a:t>2/19/2025</a:t>
+              <a:t>2/24/2025</a:t>
             </a:fld>
             <a:endParaRPr lang="en-US"/>
           </a:p>
@@ -1726,7 +1726,7 @@
           <a:p>
             <a:fld id="{F584BFBA-6407-43D9-9246-BFF906A42630}" type="datetimeFigureOut">
               <a:rPr lang="en-US" smtClean="0"/>
-              <a:t>2/19/2025</a:t>
+              <a:t>2/24/2025</a:t>
             </a:fld>
             <a:endParaRPr lang="en-US"/>
           </a:p>
@@ -1821,7 +1821,7 @@
           <a:p>
             <a:fld id="{F584BFBA-6407-43D9-9246-BFF906A42630}" type="datetimeFigureOut">
               <a:rPr lang="en-US" smtClean="0"/>
-              <a:t>2/19/2025</a:t>
+              <a:t>2/24/2025</a:t>
             </a:fld>
             <a:endParaRPr lang="en-US"/>
           </a:p>
@@ -2098,7 +2098,7 @@
           <a:p>
             <a:fld id="{F584BFBA-6407-43D9-9246-BFF906A42630}" type="datetimeFigureOut">
               <a:rPr lang="en-US" smtClean="0"/>
-              <a:t>2/19/2025</a:t>
+              <a:t>2/24/2025</a:t>
             </a:fld>
             <a:endParaRPr lang="en-US"/>
           </a:p>
@@ -2355,7 +2355,7 @@
           <a:p>
             <a:fld id="{F584BFBA-6407-43D9-9246-BFF906A42630}" type="datetimeFigureOut">
               <a:rPr lang="en-US" smtClean="0"/>
-              <a:t>2/19/2025</a:t>
+              <a:t>2/24/2025</a:t>
             </a:fld>
             <a:endParaRPr lang="en-US"/>
           </a:p>
@@ -2568,7 +2568,7 @@
           <a:p>
             <a:fld id="{F584BFBA-6407-43D9-9246-BFF906A42630}" type="datetimeFigureOut">
               <a:rPr lang="en-US" smtClean="0"/>
-              <a:t>2/19/2025</a:t>
+              <a:t>2/24/2025</a:t>
             </a:fld>
             <a:endParaRPr lang="en-US"/>
           </a:p>
@@ -3136,7 +3136,7 @@
                   <a:latin typeface="Times New Roman" panose="02020603050405020304" pitchFamily="18" charset="0"/>
                   <a:cs typeface="Times New Roman" panose="02020603050405020304" pitchFamily="18" charset="0"/>
                 </a:rPr>
-                <a:t>Provincial Proxy Analysis Forest Land Base</a:t>
+                <a:t>Proxy Analysis Forest Land Base</a:t>
               </a:r>
               <a:r>
                 <a:rPr lang="en-CA" sz="1000" dirty="0">
@@ -3179,8 +3179,25 @@
                   <a:latin typeface="Times New Roman" panose="02020603050405020304" pitchFamily="18" charset="0"/>
                   <a:cs typeface="Times New Roman" panose="02020603050405020304" pitchFamily="18" charset="0"/>
                 </a:rPr>
-                <a:t>The portion of the FALB that is managed for timber supply and other forest management objectives (e.g., landscape-level biodiversity).</a:t>
+                <a:t>The portion of the FALB that is managed for timber supply and other forest management objectives (e.g., landscape-level biodiversity) that are analyzed during </a:t>
               </a:r>
+              <a:r>
+                <a:rPr lang="en-US" sz="1000" i="1">
+                  <a:solidFill>
+                    <a:sysClr val="windowText" lastClr="000000"/>
+                  </a:solidFill>
+                  <a:latin typeface="Times New Roman" panose="02020603050405020304" pitchFamily="18" charset="0"/>
+                  <a:cs typeface="Times New Roman" panose="02020603050405020304" pitchFamily="18" charset="0"/>
+                </a:rPr>
+                <a:t>timber supply review.</a:t>
+              </a:r>
+              <a:endParaRPr lang="en-US" sz="1000" i="1" dirty="0">
+                <a:solidFill>
+                  <a:sysClr val="windowText" lastClr="000000"/>
+                </a:solidFill>
+                <a:latin typeface="Times New Roman" panose="02020603050405020304" pitchFamily="18" charset="0"/>
+                <a:cs typeface="Times New Roman" panose="02020603050405020304" pitchFamily="18" charset="0"/>
+              </a:endParaRPr>
             </a:p>
           </p:txBody>
         </p:sp>
@@ -3243,7 +3260,7 @@
                   <a:latin typeface="Times New Roman" panose="02020603050405020304" pitchFamily="18" charset="0"/>
                   <a:cs typeface="Times New Roman" panose="02020603050405020304" pitchFamily="18" charset="0"/>
                 </a:rPr>
-                <a:t>Provincial Timber Harvesting Land Base</a:t>
+                <a:t>Proxy Timber Harvesting Land Base</a:t>
               </a:r>
               <a:r>
                 <a:rPr lang="en-CA" sz="1000" dirty="0">
@@ -3286,7 +3303,7 @@
                   <a:latin typeface="Times New Roman" panose="02020603050405020304" pitchFamily="18" charset="0"/>
                   <a:cs typeface="Times New Roman" panose="02020603050405020304" pitchFamily="18" charset="0"/>
                 </a:rPr>
-                <a:t>The portion of the AFLB where timber harvesting is considered both available and economically feasible, given the objectives for all relevant forest values, existing timber quality, market values and applicable technology. It includes areas where timber harvesting is limited due to management objectives (e.g., conditional harvest zones).</a:t>
+                <a:t>The portion of the AFLB where timber harvesting is considered both acceptable and economically feasible, given the objectives for all relevant forest values, existing timber quality, market values and applicable technology. It includes areas where timber harvesting is limited due to management objectives (e.g., conditional harvest zones).</a:t>
               </a:r>
               <a:endParaRPr lang="en-US" sz="1000" i="1" dirty="0">
                 <a:solidFill>

</xml_diff>